<commit_message>
updated report and presentation v2
</commit_message>
<xml_diff>
--- a/Presentation/DIO_Research_Presentation_v2.pptx
+++ b/Presentation/DIO_Research_Presentation_v2.pptx
@@ -3373,6 +3373,41 @@
           </a:p>
         </p:txBody>
       </p:sp>
+      <p:sp>
+        <p:nvSpPr>
+          <p:cNvPr id="4" name="TextBox 3"/>
+          <p:cNvSpPr txBox="1"/>
+          <p:nvPr/>
+        </p:nvSpPr>
+        <p:spPr>
+          <a:xfrm>
+            <a:off x="8229600" y="6400800"/>
+            <a:ext cx="731520" cy="365760"/>
+          </a:xfrm>
+          <a:prstGeom prst="rect">
+            <a:avLst/>
+          </a:prstGeom>
+          <a:noFill/>
+        </p:spPr>
+        <p:txBody>
+          <a:bodyPr wrap="none">
+            <a:spAutoFit/>
+          </a:bodyPr>
+          <a:lstStyle/>
+          <a:p>
+            <a:pPr algn="r">
+              <a:defRPr sz="1000">
+                <a:solidFill>
+                  <a:srgbClr val="808080"/>
+                </a:solidFill>
+              </a:defRPr>
+            </a:pPr>
+            <a:r>
+              <a:t>10</a:t>
+            </a:r>
+          </a:p>
+        </p:txBody>
+      </p:sp>
     </p:spTree>
   </p:cSld>
   <p:clrMapOvr>
@@ -3552,6 +3587,41 @@
           </a:p>
         </p:txBody>
       </p:sp>
+      <p:sp>
+        <p:nvSpPr>
+          <p:cNvPr id="4" name="TextBox 3"/>
+          <p:cNvSpPr txBox="1"/>
+          <p:nvPr/>
+        </p:nvSpPr>
+        <p:spPr>
+          <a:xfrm>
+            <a:off x="8229600" y="6400800"/>
+            <a:ext cx="731520" cy="365760"/>
+          </a:xfrm>
+          <a:prstGeom prst="rect">
+            <a:avLst/>
+          </a:prstGeom>
+          <a:noFill/>
+        </p:spPr>
+        <p:txBody>
+          <a:bodyPr wrap="none">
+            <a:spAutoFit/>
+          </a:bodyPr>
+          <a:lstStyle/>
+          <a:p>
+            <a:pPr algn="r">
+              <a:defRPr sz="1000">
+                <a:solidFill>
+                  <a:srgbClr val="808080"/>
+                </a:solidFill>
+              </a:defRPr>
+            </a:pPr>
+            <a:r>
+              <a:t>11</a:t>
+            </a:r>
+          </a:p>
+        </p:txBody>
+      </p:sp>
     </p:spTree>
   </p:cSld>
   <p:clrMapOvr>
@@ -3591,6 +3661,41 @@
           </a:p>
         </p:txBody>
       </p:sp>
+      <p:sp>
+        <p:nvSpPr>
+          <p:cNvPr id="3" name="TextBox 2"/>
+          <p:cNvSpPr txBox="1"/>
+          <p:nvPr/>
+        </p:nvSpPr>
+        <p:spPr>
+          <a:xfrm>
+            <a:off x="8229600" y="6400800"/>
+            <a:ext cx="731520" cy="365760"/>
+          </a:xfrm>
+          <a:prstGeom prst="rect">
+            <a:avLst/>
+          </a:prstGeom>
+          <a:noFill/>
+        </p:spPr>
+        <p:txBody>
+          <a:bodyPr wrap="none">
+            <a:spAutoFit/>
+          </a:bodyPr>
+          <a:lstStyle/>
+          <a:p>
+            <a:pPr algn="r">
+              <a:defRPr sz="1000">
+                <a:solidFill>
+                  <a:srgbClr val="808080"/>
+                </a:solidFill>
+              </a:defRPr>
+            </a:pPr>
+            <a:r>
+              <a:t>12</a:t>
+            </a:r>
+          </a:p>
+        </p:txBody>
+      </p:sp>
     </p:spTree>
   </p:cSld>
   <p:clrMapOvr>
@@ -3736,6 +3841,41 @@
           </a:p>
         </p:txBody>
       </p:sp>
+      <p:sp>
+        <p:nvSpPr>
+          <p:cNvPr id="4" name="TextBox 3"/>
+          <p:cNvSpPr txBox="1"/>
+          <p:nvPr/>
+        </p:nvSpPr>
+        <p:spPr>
+          <a:xfrm>
+            <a:off x="8229600" y="6400800"/>
+            <a:ext cx="731520" cy="365760"/>
+          </a:xfrm>
+          <a:prstGeom prst="rect">
+            <a:avLst/>
+          </a:prstGeom>
+          <a:noFill/>
+        </p:spPr>
+        <p:txBody>
+          <a:bodyPr wrap="none">
+            <a:spAutoFit/>
+          </a:bodyPr>
+          <a:lstStyle/>
+          <a:p>
+            <a:pPr algn="r">
+              <a:defRPr sz="1000">
+                <a:solidFill>
+                  <a:srgbClr val="808080"/>
+                </a:solidFill>
+              </a:defRPr>
+            </a:pPr>
+            <a:r>
+              <a:t>13</a:t>
+            </a:r>
+          </a:p>
+        </p:txBody>
+      </p:sp>
     </p:spTree>
   </p:cSld>
   <p:clrMapOvr>
@@ -3860,7 +4000,7 @@
               <a:defRPr sz="2000"/>
             </a:pPr>
             <a:r>
-              <a:t>  - Tested across 30 different splits: only 94.72% average</a:t>
+              <a:t>  - Tested across 30 different splits: only 94.37% average</a:t>
             </a:r>
           </a:p>
           <a:p>
@@ -3919,6 +4059,41 @@
             </a:pPr>
             <a:r>
               <a:t>This discovery shaped everything that followed...</a:t>
+            </a:r>
+          </a:p>
+        </p:txBody>
+      </p:sp>
+      <p:sp>
+        <p:nvSpPr>
+          <p:cNvPr id="4" name="TextBox 3"/>
+          <p:cNvSpPr txBox="1"/>
+          <p:nvPr/>
+        </p:nvSpPr>
+        <p:spPr>
+          <a:xfrm>
+            <a:off x="8229600" y="6400800"/>
+            <a:ext cx="731520" cy="365760"/>
+          </a:xfrm>
+          <a:prstGeom prst="rect">
+            <a:avLst/>
+          </a:prstGeom>
+          <a:noFill/>
+        </p:spPr>
+        <p:txBody>
+          <a:bodyPr wrap="none">
+            <a:spAutoFit/>
+          </a:bodyPr>
+          <a:lstStyle/>
+          <a:p>
+            <a:pPr algn="r">
+              <a:defRPr sz="1000">
+                <a:solidFill>
+                  <a:srgbClr val="808080"/>
+                </a:solidFill>
+              </a:defRPr>
+            </a:pPr>
+            <a:r>
+              <a:t>14</a:t>
             </a:r>
           </a:p>
         </p:txBody>
@@ -4102,6 +4277,41 @@
           </a:p>
         </p:txBody>
       </p:sp>
+      <p:sp>
+        <p:nvSpPr>
+          <p:cNvPr id="4" name="TextBox 3"/>
+          <p:cNvSpPr txBox="1"/>
+          <p:nvPr/>
+        </p:nvSpPr>
+        <p:spPr>
+          <a:xfrm>
+            <a:off x="8229600" y="6400800"/>
+            <a:ext cx="731520" cy="365760"/>
+          </a:xfrm>
+          <a:prstGeom prst="rect">
+            <a:avLst/>
+          </a:prstGeom>
+          <a:noFill/>
+        </p:spPr>
+        <p:txBody>
+          <a:bodyPr wrap="none">
+            <a:spAutoFit/>
+          </a:bodyPr>
+          <a:lstStyle/>
+          <a:p>
+            <a:pPr algn="r">
+              <a:defRPr sz="1000">
+                <a:solidFill>
+                  <a:srgbClr val="808080"/>
+                </a:solidFill>
+              </a:defRPr>
+            </a:pPr>
+            <a:r>
+              <a:t>15</a:t>
+            </a:r>
+          </a:p>
+        </p:txBody>
+      </p:sp>
     </p:spTree>
   </p:cSld>
   <p:clrMapOvr>
@@ -4141,6 +4351,41 @@
           </a:p>
         </p:txBody>
       </p:sp>
+      <p:sp>
+        <p:nvSpPr>
+          <p:cNvPr id="3" name="TextBox 2"/>
+          <p:cNvSpPr txBox="1"/>
+          <p:nvPr/>
+        </p:nvSpPr>
+        <p:spPr>
+          <a:xfrm>
+            <a:off x="8229600" y="6400800"/>
+            <a:ext cx="731520" cy="365760"/>
+          </a:xfrm>
+          <a:prstGeom prst="rect">
+            <a:avLst/>
+          </a:prstGeom>
+          <a:noFill/>
+        </p:spPr>
+        <p:txBody>
+          <a:bodyPr wrap="none">
+            <a:spAutoFit/>
+          </a:bodyPr>
+          <a:lstStyle/>
+          <a:p>
+            <a:pPr algn="r">
+              <a:defRPr sz="1000">
+                <a:solidFill>
+                  <a:srgbClr val="808080"/>
+                </a:solidFill>
+              </a:defRPr>
+            </a:pPr>
+            <a:r>
+              <a:t>16</a:t>
+            </a:r>
+          </a:p>
+        </p:txBody>
+      </p:sp>
     </p:spTree>
   </p:cSld>
   <p:clrMapOvr>
@@ -4180,6 +4425,41 @@
           </a:p>
         </p:txBody>
       </p:sp>
+      <p:sp>
+        <p:nvSpPr>
+          <p:cNvPr id="3" name="TextBox 2"/>
+          <p:cNvSpPr txBox="1"/>
+          <p:nvPr/>
+        </p:nvSpPr>
+        <p:spPr>
+          <a:xfrm>
+            <a:off x="8229600" y="6400800"/>
+            <a:ext cx="731520" cy="365760"/>
+          </a:xfrm>
+          <a:prstGeom prst="rect">
+            <a:avLst/>
+          </a:prstGeom>
+          <a:noFill/>
+        </p:spPr>
+        <p:txBody>
+          <a:bodyPr wrap="none">
+            <a:spAutoFit/>
+          </a:bodyPr>
+          <a:lstStyle/>
+          <a:p>
+            <a:pPr algn="r">
+              <a:defRPr sz="1000">
+                <a:solidFill>
+                  <a:srgbClr val="808080"/>
+                </a:solidFill>
+              </a:defRPr>
+            </a:pPr>
+            <a:r>
+              <a:t>17</a:t>
+            </a:r>
+          </a:p>
+        </p:txBody>
+      </p:sp>
     </p:spTree>
   </p:cSld>
   <p:clrMapOvr>
@@ -4238,7 +4518,7 @@
               <a:defRPr sz="2000"/>
             </a:pPr>
             <a:r>
-              <a:t>Wisconsin Diagnostic Breast Cancer Dataset</a:t>
+              <a:t>Wisconsin Diagnostic Breast Cancer Dataset [2]</a:t>
             </a:r>
           </a:p>
           <a:p>
@@ -4350,6 +4630,41 @@
             </a:pPr>
             <a:r>
               <a:t>Experimental setup: 70% training, 30% testing (stratified by class)</a:t>
+            </a:r>
+          </a:p>
+        </p:txBody>
+      </p:sp>
+      <p:sp>
+        <p:nvSpPr>
+          <p:cNvPr id="4" name="TextBox 3"/>
+          <p:cNvSpPr txBox="1"/>
+          <p:nvPr/>
+        </p:nvSpPr>
+        <p:spPr>
+          <a:xfrm>
+            <a:off x="8229600" y="6400800"/>
+            <a:ext cx="731520" cy="365760"/>
+          </a:xfrm>
+          <a:prstGeom prst="rect">
+            <a:avLst/>
+          </a:prstGeom>
+          <a:noFill/>
+        </p:spPr>
+        <p:txBody>
+          <a:bodyPr wrap="none">
+            <a:spAutoFit/>
+          </a:bodyPr>
+          <a:lstStyle/>
+          <a:p>
+            <a:pPr algn="r">
+              <a:defRPr sz="1000">
+                <a:solidFill>
+                  <a:srgbClr val="808080"/>
+                </a:solidFill>
+              </a:defRPr>
+            </a:pPr>
+            <a:r>
+              <a:t>18</a:t>
             </a:r>
           </a:p>
         </p:txBody>
@@ -4470,7 +4785,7 @@
               <a:defRPr sz="2000"/>
             </a:pPr>
             <a:r>
-              <a:t>But then we ran 30-run statistical validation...</a:t>
+              <a:t>But then we ran 30-run statistical validation [7]...</a:t>
             </a:r>
           </a:p>
           <a:p>
@@ -4491,7 +4806,7 @@
               <a:defRPr sz="2000"/>
             </a:pPr>
             <a:r>
-              <a:t>  - Average accuracy across 30 different splits: 94.72% ± 1.76%</a:t>
+              <a:t>  - Average accuracy across 30 different splits: 94.37% ± 1.82%</a:t>
             </a:r>
           </a:p>
           <a:p>
@@ -4545,6 +4860,41 @@
             </a:pPr>
             <a:r>
               <a:t>  - Classic case of 'overfitting' but at the optimization level, not model level</a:t>
+            </a:r>
+          </a:p>
+        </p:txBody>
+      </p:sp>
+      <p:sp>
+        <p:nvSpPr>
+          <p:cNvPr id="4" name="TextBox 3"/>
+          <p:cNvSpPr txBox="1"/>
+          <p:nvPr/>
+        </p:nvSpPr>
+        <p:spPr>
+          <a:xfrm>
+            <a:off x="8229600" y="6400800"/>
+            <a:ext cx="731520" cy="365760"/>
+          </a:xfrm>
+          <a:prstGeom prst="rect">
+            <a:avLst/>
+          </a:prstGeom>
+          <a:noFill/>
+        </p:spPr>
+        <p:txBody>
+          <a:bodyPr wrap="none">
+            <a:spAutoFit/>
+          </a:bodyPr>
+          <a:lstStyle/>
+          <a:p>
+            <a:pPr algn="r">
+              <a:defRPr sz="1000">
+                <a:solidFill>
+                  <a:srgbClr val="808080"/>
+                </a:solidFill>
+              </a:defRPr>
+            </a:pPr>
+            <a:r>
+              <a:t>19</a:t>
             </a:r>
           </a:p>
         </p:txBody>
@@ -4665,6 +5015,41 @@
           </a:p>
         </p:txBody>
       </p:sp>
+      <p:sp>
+        <p:nvSpPr>
+          <p:cNvPr id="4" name="TextBox 3"/>
+          <p:cNvSpPr txBox="1"/>
+          <p:nvPr/>
+        </p:nvSpPr>
+        <p:spPr>
+          <a:xfrm>
+            <a:off x="8229600" y="6400800"/>
+            <a:ext cx="731520" cy="365760"/>
+          </a:xfrm>
+          <a:prstGeom prst="rect">
+            <a:avLst/>
+          </a:prstGeom>
+          <a:noFill/>
+        </p:spPr>
+        <p:txBody>
+          <a:bodyPr wrap="none">
+            <a:spAutoFit/>
+          </a:bodyPr>
+          <a:lstStyle/>
+          <a:p>
+            <a:pPr algn="r">
+              <a:defRPr sz="1000">
+                <a:solidFill>
+                  <a:srgbClr val="808080"/>
+                </a:solidFill>
+              </a:defRPr>
+            </a:pPr>
+            <a:r>
+              <a:t>2</a:t>
+            </a:r>
+          </a:p>
+        </p:txBody>
+      </p:sp>
     </p:spTree>
   </p:cSld>
   <p:clrMapOvr>
@@ -4789,7 +5174,7 @@
               <a:defRPr sz="2000"/>
             </a:pPr>
             <a:r>
-              <a:t>  - Average accuracy: 96.26% ± 1.33%</a:t>
+              <a:t>  - Average accuracy: 96.55% ± 1.51%</a:t>
             </a:r>
           </a:p>
           <a:p>
@@ -4856,6 +5241,41 @@
             </a:pPr>
             <a:r>
               <a:t>The lesson: Use cross-validation during optimization, not just for final evaluation</a:t>
+            </a:r>
+          </a:p>
+        </p:txBody>
+      </p:sp>
+      <p:sp>
+        <p:nvSpPr>
+          <p:cNvPr id="4" name="TextBox 3"/>
+          <p:cNvSpPr txBox="1"/>
+          <p:nvPr/>
+        </p:nvSpPr>
+        <p:spPr>
+          <a:xfrm>
+            <a:off x="8229600" y="6400800"/>
+            <a:ext cx="731520" cy="365760"/>
+          </a:xfrm>
+          <a:prstGeom prst="rect">
+            <a:avLst/>
+          </a:prstGeom>
+          <a:noFill/>
+        </p:spPr>
+        <p:txBody>
+          <a:bodyPr wrap="none">
+            <a:spAutoFit/>
+          </a:bodyPr>
+          <a:lstStyle/>
+          <a:p>
+            <a:pPr algn="r">
+              <a:defRPr sz="1000">
+                <a:solidFill>
+                  <a:srgbClr val="808080"/>
+                </a:solidFill>
+              </a:defRPr>
+            </a:pPr>
+            <a:r>
+              <a:t>20</a:t>
             </a:r>
           </a:p>
         </p:txBody>
@@ -4931,7 +5351,7 @@
               <a:defRPr sz="2000"/>
             </a:pPr>
             <a:r>
-              <a:t>Why try XGBoost?</a:t>
+              <a:t>Why try XGBoost [5]?</a:t>
             </a:r>
           </a:p>
           <a:p>
@@ -4984,15 +5404,15 @@
               <a:defRPr sz="2000"/>
             </a:pPr>
             <a:r>
-              <a:t>  - Average accuracy: 96.34% ± 1.23%  ← HIGHEST OF ALL APPROACHES</a:t>
-            </a:r>
-          </a:p>
-          <a:p>
-            <a:pPr>
-              <a:defRPr sz="2000"/>
-            </a:pPr>
-            <a:r>
-              <a:t>  - Features: 17 out of 30 (43% reduction)</a:t>
+              <a:t>  - Average accuracy: 96.88% ± 1.10%  ← HIGHEST OF ALL APPROACHES</a:t>
+            </a:r>
+          </a:p>
+          <a:p>
+            <a:pPr>
+              <a:defRPr sz="2000"/>
+            </a:pPr>
+            <a:r>
+              <a:t>  - Features: 10 out of 30 (67% reduction)</a:t>
             </a:r>
           </a:p>
           <a:p>
@@ -5075,6 +5495,41 @@
             </a:pPr>
             <a:r>
               <a:t>  - Algorithm choice matters for optimization strategy</a:t>
+            </a:r>
+          </a:p>
+        </p:txBody>
+      </p:sp>
+      <p:sp>
+        <p:nvSpPr>
+          <p:cNvPr id="4" name="TextBox 3"/>
+          <p:cNvSpPr txBox="1"/>
+          <p:nvPr/>
+        </p:nvSpPr>
+        <p:spPr>
+          <a:xfrm>
+            <a:off x="8229600" y="6400800"/>
+            <a:ext cx="731520" cy="365760"/>
+          </a:xfrm>
+          <a:prstGeom prst="rect">
+            <a:avLst/>
+          </a:prstGeom>
+          <a:noFill/>
+        </p:spPr>
+        <p:txBody>
+          <a:bodyPr wrap="none">
+            <a:spAutoFit/>
+          </a:bodyPr>
+          <a:lstStyle/>
+          <a:p>
+            <a:pPr algn="r">
+              <a:defRPr sz="1000">
+                <a:solidFill>
+                  <a:srgbClr val="808080"/>
+                </a:solidFill>
+              </a:defRPr>
+            </a:pPr>
+            <a:r>
+              <a:t>21</a:t>
             </a:r>
           </a:p>
         </p:txBody>
@@ -5118,6 +5573,41 @@
           </a:p>
         </p:txBody>
       </p:sp>
+      <p:sp>
+        <p:nvSpPr>
+          <p:cNvPr id="3" name="TextBox 2"/>
+          <p:cNvSpPr txBox="1"/>
+          <p:nvPr/>
+        </p:nvSpPr>
+        <p:spPr>
+          <a:xfrm>
+            <a:off x="8229600" y="6400800"/>
+            <a:ext cx="731520" cy="365760"/>
+          </a:xfrm>
+          <a:prstGeom prst="rect">
+            <a:avLst/>
+          </a:prstGeom>
+          <a:noFill/>
+        </p:spPr>
+        <p:txBody>
+          <a:bodyPr wrap="none">
+            <a:spAutoFit/>
+          </a:bodyPr>
+          <a:lstStyle/>
+          <a:p>
+            <a:pPr algn="r">
+              <a:defRPr sz="1000">
+                <a:solidFill>
+                  <a:srgbClr val="808080"/>
+                </a:solidFill>
+              </a:defRPr>
+            </a:pPr>
+            <a:r>
+              <a:t>22</a:t>
+            </a:r>
+          </a:p>
+        </p:txBody>
+      </p:sp>
     </p:spTree>
   </p:cSld>
   <p:clrMapOvr>
@@ -5197,7 +5687,7 @@
               <a:defRPr sz="2000"/>
             </a:pPr>
             <a:r>
-              <a:t>  - Accuracy: 94.72% ± 1.76%  |  Features: 8  |  Rank: #7</a:t>
+              <a:t>  - Accuracy: 94.37% ± 1.82%  |  Features: 8  |  Rank: #6</a:t>
             </a:r>
           </a:p>
           <a:p>
@@ -5226,7 +5716,7 @@
               <a:defRPr sz="2000"/>
             </a:pPr>
             <a:r>
-              <a:t>  - Accuracy: 96.26% ± 1.33%  |  Features: 6  |  Rank: #3</a:t>
+              <a:t>  - Accuracy: 96.55% ± 1.51%  |  Features: 6  |  Rank: #1</a:t>
             </a:r>
           </a:p>
           <a:p>
@@ -5255,7 +5745,7 @@
               <a:defRPr sz="2000"/>
             </a:pPr>
             <a:r>
-              <a:t>  - Accuracy: 96.34% ± 1.23%  |  Features: 17  |  Rank: #1</a:t>
+              <a:t>  - Accuracy: 96.88% ± 1.10%  |  Features: 10  |  Rank: #1</a:t>
             </a:r>
           </a:p>
           <a:p>
@@ -5306,6 +5796,41 @@
             </a:pPr>
             <a:r>
               <a:t>Key insight: Algorithm robustness determines whether CV is needed during optimization</a:t>
+            </a:r>
+          </a:p>
+        </p:txBody>
+      </p:sp>
+      <p:sp>
+        <p:nvSpPr>
+          <p:cNvPr id="4" name="TextBox 3"/>
+          <p:cNvSpPr txBox="1"/>
+          <p:nvPr/>
+        </p:nvSpPr>
+        <p:spPr>
+          <a:xfrm>
+            <a:off x="8229600" y="6400800"/>
+            <a:ext cx="731520" cy="365760"/>
+          </a:xfrm>
+          <a:prstGeom prst="rect">
+            <a:avLst/>
+          </a:prstGeom>
+          <a:noFill/>
+        </p:spPr>
+        <p:txBody>
+          <a:bodyPr wrap="none">
+            <a:spAutoFit/>
+          </a:bodyPr>
+          <a:lstStyle/>
+          <a:p>
+            <a:pPr algn="r">
+              <a:defRPr sz="1000">
+                <a:solidFill>
+                  <a:srgbClr val="808080"/>
+                </a:solidFill>
+              </a:defRPr>
+            </a:pPr>
+            <a:r>
+              <a:t>23</a:t>
             </a:r>
           </a:p>
         </p:txBody>
@@ -5344,7 +5869,7 @@
           <a:lstStyle/>
           <a:p>
             <a:r>
-              <a:t>2.3.5 Statistical Rigor: Wilcoxon Signed-Rank Test</a:t>
+              <a:t>2.3.5 Statistical Rigor: Wilcoxon Signed-Rank Test [7]</a:t>
             </a:r>
           </a:p>
         </p:txBody>
@@ -5517,6 +6042,41 @@
             </a:pPr>
             <a:r>
               <a:t>  ns = not significant (could be chance)</a:t>
+            </a:r>
+          </a:p>
+        </p:txBody>
+      </p:sp>
+      <p:sp>
+        <p:nvSpPr>
+          <p:cNvPr id="4" name="TextBox 3"/>
+          <p:cNvSpPr txBox="1"/>
+          <p:nvPr/>
+        </p:nvSpPr>
+        <p:spPr>
+          <a:xfrm>
+            <a:off x="8229600" y="6400800"/>
+            <a:ext cx="731520" cy="365760"/>
+          </a:xfrm>
+          <a:prstGeom prst="rect">
+            <a:avLst/>
+          </a:prstGeom>
+          <a:noFill/>
+        </p:spPr>
+        <p:txBody>
+          <a:bodyPr wrap="none">
+            <a:spAutoFit/>
+          </a:bodyPr>
+          <a:lstStyle/>
+          <a:p>
+            <a:pPr algn="r">
+              <a:defRPr sz="1000">
+                <a:solidFill>
+                  <a:srgbClr val="808080"/>
+                </a:solidFill>
+              </a:defRPr>
+            </a:pPr>
+            <a:r>
+              <a:t>24</a:t>
             </a:r>
           </a:p>
         </p:txBody>
@@ -5592,7 +6152,7 @@
               <a:defRPr sz="2000"/>
             </a:pPr>
             <a:r>
-              <a:t>CIFAR-10 Dataset:</a:t>
+              <a:t>CIFAR-10 Dataset [3]:</a:t>
             </a:r>
           </a:p>
           <a:p>
@@ -5637,7 +6197,7 @@
               <a:defRPr sz="2000"/>
             </a:pPr>
             <a:r>
-              <a:t>  - Used ResNet50 (pretrained on ImageNet) to extract features</a:t>
+              <a:t>  - Used ResNet50 [4] (pretrained on ImageNet) to extract features</a:t>
             </a:r>
           </a:p>
           <a:p>
@@ -5699,6 +6259,41 @@
             </a:pPr>
             <a:r>
               <a:t>  - Much harder to optimize—needs way more computation</a:t>
+            </a:r>
+          </a:p>
+        </p:txBody>
+      </p:sp>
+      <p:sp>
+        <p:nvSpPr>
+          <p:cNvPr id="4" name="TextBox 3"/>
+          <p:cNvSpPr txBox="1"/>
+          <p:nvPr/>
+        </p:nvSpPr>
+        <p:spPr>
+          <a:xfrm>
+            <a:off x="8229600" y="6400800"/>
+            <a:ext cx="731520" cy="365760"/>
+          </a:xfrm>
+          <a:prstGeom prst="rect">
+            <a:avLst/>
+          </a:prstGeom>
+          <a:noFill/>
+        </p:spPr>
+        <p:txBody>
+          <a:bodyPr wrap="none">
+            <a:spAutoFit/>
+          </a:bodyPr>
+          <a:lstStyle/>
+          <a:p>
+            <a:pPr algn="r">
+              <a:defRPr sz="1000">
+                <a:solidFill>
+                  <a:srgbClr val="808080"/>
+                </a:solidFill>
+              </a:defRPr>
+            </a:pPr>
+            <a:r>
+              <a:t>25</a:t>
             </a:r>
           </a:p>
         </p:txBody>
@@ -5911,6 +6506,41 @@
           </a:p>
         </p:txBody>
       </p:sp>
+      <p:sp>
+        <p:nvSpPr>
+          <p:cNvPr id="4" name="TextBox 3"/>
+          <p:cNvSpPr txBox="1"/>
+          <p:nvPr/>
+        </p:nvSpPr>
+        <p:spPr>
+          <a:xfrm>
+            <a:off x="8229600" y="6400800"/>
+            <a:ext cx="731520" cy="365760"/>
+          </a:xfrm>
+          <a:prstGeom prst="rect">
+            <a:avLst/>
+          </a:prstGeom>
+          <a:noFill/>
+        </p:spPr>
+        <p:txBody>
+          <a:bodyPr wrap="none">
+            <a:spAutoFit/>
+          </a:bodyPr>
+          <a:lstStyle/>
+          <a:p>
+            <a:pPr algn="r">
+              <a:defRPr sz="1000">
+                <a:solidFill>
+                  <a:srgbClr val="808080"/>
+                </a:solidFill>
+              </a:defRPr>
+            </a:pPr>
+            <a:r>
+              <a:t>26</a:t>
+            </a:r>
+          </a:p>
+        </p:txBody>
+      </p:sp>
     </p:spTree>
   </p:cSld>
   <p:clrMapOvr>
@@ -5950,6 +6580,41 @@
           </a:p>
         </p:txBody>
       </p:sp>
+      <p:sp>
+        <p:nvSpPr>
+          <p:cNvPr id="3" name="TextBox 2"/>
+          <p:cNvSpPr txBox="1"/>
+          <p:nvPr/>
+        </p:nvSpPr>
+        <p:spPr>
+          <a:xfrm>
+            <a:off x="8229600" y="6400800"/>
+            <a:ext cx="731520" cy="365760"/>
+          </a:xfrm>
+          <a:prstGeom prst="rect">
+            <a:avLst/>
+          </a:prstGeom>
+          <a:noFill/>
+        </p:spPr>
+        <p:txBody>
+          <a:bodyPr wrap="none">
+            <a:spAutoFit/>
+          </a:bodyPr>
+          <a:lstStyle/>
+          <a:p>
+            <a:pPr algn="r">
+              <a:defRPr sz="1000">
+                <a:solidFill>
+                  <a:srgbClr val="808080"/>
+                </a:solidFill>
+              </a:defRPr>
+            </a:pPr>
+            <a:r>
+              <a:t>27</a:t>
+            </a:r>
+          </a:p>
+        </p:txBody>
+      </p:sp>
     </p:spTree>
   </p:cSld>
   <p:clrMapOvr>
@@ -6137,6 +6802,41 @@
           </a:p>
         </p:txBody>
       </p:sp>
+      <p:sp>
+        <p:nvSpPr>
+          <p:cNvPr id="4" name="TextBox 3"/>
+          <p:cNvSpPr txBox="1"/>
+          <p:nvPr/>
+        </p:nvSpPr>
+        <p:spPr>
+          <a:xfrm>
+            <a:off x="8229600" y="6400800"/>
+            <a:ext cx="731520" cy="365760"/>
+          </a:xfrm>
+          <a:prstGeom prst="rect">
+            <a:avLst/>
+          </a:prstGeom>
+          <a:noFill/>
+        </p:spPr>
+        <p:txBody>
+          <a:bodyPr wrap="none">
+            <a:spAutoFit/>
+          </a:bodyPr>
+          <a:lstStyle/>
+          <a:p>
+            <a:pPr algn="r">
+              <a:defRPr sz="1000">
+                <a:solidFill>
+                  <a:srgbClr val="808080"/>
+                </a:solidFill>
+              </a:defRPr>
+            </a:pPr>
+            <a:r>
+              <a:t>28</a:t>
+            </a:r>
+          </a:p>
+        </p:txBody>
+      </p:sp>
     </p:spTree>
   </p:cSld>
   <p:clrMapOvr>
@@ -6369,6 +7069,41 @@
           </a:p>
         </p:txBody>
       </p:sp>
+      <p:sp>
+        <p:nvSpPr>
+          <p:cNvPr id="4" name="TextBox 3"/>
+          <p:cNvSpPr txBox="1"/>
+          <p:nvPr/>
+        </p:nvSpPr>
+        <p:spPr>
+          <a:xfrm>
+            <a:off x="8229600" y="6400800"/>
+            <a:ext cx="731520" cy="365760"/>
+          </a:xfrm>
+          <a:prstGeom prst="rect">
+            <a:avLst/>
+          </a:prstGeom>
+          <a:noFill/>
+        </p:spPr>
+        <p:txBody>
+          <a:bodyPr wrap="none">
+            <a:spAutoFit/>
+          </a:bodyPr>
+          <a:lstStyle/>
+          <a:p>
+            <a:pPr algn="r">
+              <a:defRPr sz="1000">
+                <a:solidFill>
+                  <a:srgbClr val="808080"/>
+                </a:solidFill>
+              </a:defRPr>
+            </a:pPr>
+            <a:r>
+              <a:t>29</a:t>
+            </a:r>
+          </a:p>
+        </p:txBody>
+      </p:sp>
     </p:spTree>
   </p:cSld>
   <p:clrMapOvr>
@@ -6544,6 +7279,41 @@
           </a:p>
         </p:txBody>
       </p:sp>
+      <p:sp>
+        <p:nvSpPr>
+          <p:cNvPr id="4" name="TextBox 3"/>
+          <p:cNvSpPr txBox="1"/>
+          <p:nvPr/>
+        </p:nvSpPr>
+        <p:spPr>
+          <a:xfrm>
+            <a:off x="8229600" y="6400800"/>
+            <a:ext cx="731520" cy="365760"/>
+          </a:xfrm>
+          <a:prstGeom prst="rect">
+            <a:avLst/>
+          </a:prstGeom>
+          <a:noFill/>
+        </p:spPr>
+        <p:txBody>
+          <a:bodyPr wrap="none">
+            <a:spAutoFit/>
+          </a:bodyPr>
+          <a:lstStyle/>
+          <a:p>
+            <a:pPr algn="r">
+              <a:defRPr sz="1000">
+                <a:solidFill>
+                  <a:srgbClr val="808080"/>
+                </a:solidFill>
+              </a:defRPr>
+            </a:pPr>
+            <a:r>
+              <a:t>3</a:t>
+            </a:r>
+          </a:p>
+        </p:txBody>
+      </p:sp>
     </p:spTree>
   </p:cSld>
   <p:clrMapOvr>
@@ -6631,7 +7401,7 @@
               <a:defRPr sz="2000"/>
             </a:pPr>
             <a:r>
-              <a:t>  - Single-run results can be wildly misleading (100% → 94.72%)</a:t>
+              <a:t>  - Single-run results can be wildly misleading (100% → 94.37%)</a:t>
             </a:r>
           </a:p>
           <a:p>
@@ -6734,7 +7504,7 @@
               <a:defRPr sz="2000"/>
             </a:pPr>
             <a:r>
-              <a:t>  - 96.34% accuracy (best overall), 43% feature reduction</a:t>
+              <a:t>  - 96.88% accuracy (best overall), 67% feature reduction</a:t>
             </a:r>
           </a:p>
           <a:p>
@@ -6764,6 +7534,41 @@
             </a:pPr>
             <a:r>
               <a:t>Final thought: Optimization isn't magic—it needs adequate investment</a:t>
+            </a:r>
+          </a:p>
+        </p:txBody>
+      </p:sp>
+      <p:sp>
+        <p:nvSpPr>
+          <p:cNvPr id="4" name="TextBox 3"/>
+          <p:cNvSpPr txBox="1"/>
+          <p:nvPr/>
+        </p:nvSpPr>
+        <p:spPr>
+          <a:xfrm>
+            <a:off x="8229600" y="6400800"/>
+            <a:ext cx="731520" cy="365760"/>
+          </a:xfrm>
+          <a:prstGeom prst="rect">
+            <a:avLst/>
+          </a:prstGeom>
+          <a:noFill/>
+        </p:spPr>
+        <p:txBody>
+          <a:bodyPr wrap="none">
+            <a:spAutoFit/>
+          </a:bodyPr>
+          <a:lstStyle/>
+          <a:p>
+            <a:pPr algn="r">
+              <a:defRPr sz="1000">
+                <a:solidFill>
+                  <a:srgbClr val="808080"/>
+                </a:solidFill>
+              </a:defRPr>
+            </a:pPr>
+            <a:r>
+              <a:t>30</a:t>
             </a:r>
           </a:p>
         </p:txBody>
@@ -6839,7 +7644,7 @@
               <a:defRPr sz="2000"/>
             </a:pPr>
             <a:r>
-              <a:t>Choose DIO-XGBoost (96.34%, 17 features) if:</a:t>
+              <a:t>Choose DIO-XGBoost (96.88%, 10 features) if:</a:t>
             </a:r>
           </a:p>
           <a:p>
@@ -6863,20 +7668,20 @@
               <a:defRPr sz="2000"/>
             </a:pPr>
             <a:r>
-              <a:t>  - 43% feature reduction still provides efficiency gains</a:t>
-            </a:r>
-          </a:p>
-          <a:p>
-            <a:pPr>
-              <a:defRPr sz="2000"/>
-            </a:pPr>
-          </a:p>
-          <a:p>
-            <a:pPr>
-              <a:defRPr sz="2000"/>
-            </a:pPr>
-            <a:r>
-              <a:t>Choose DIO-RF-CV (96.26%, 6 features) if:</a:t>
+              <a:t>  - 67% feature reduction provides significant efficiency gains</a:t>
+            </a:r>
+          </a:p>
+          <a:p>
+            <a:pPr>
+              <a:defRPr sz="2000"/>
+            </a:pPr>
+          </a:p>
+          <a:p>
+            <a:pPr>
+              <a:defRPr sz="2000"/>
+            </a:pPr>
+            <a:r>
+              <a:t>Choose DIO-RF-CV (96.55%, 6 features) if:</a:t>
             </a:r>
           </a:p>
           <a:p>
@@ -6913,7 +7718,7 @@
               <a:defRPr sz="2000"/>
             </a:pPr>
             <a:r>
-              <a:t>Avoid DIO-RF-Single (94.72%, 8 features) unless:</a:t>
+              <a:t>Avoid DIO-RF-Single (94.37%, 8 features) unless:</a:t>
             </a:r>
           </a:p>
           <a:p>
@@ -6967,6 +7772,41 @@
             </a:pPr>
             <a:r>
               <a:t>  - Match optimization budget to problem dimensionality</a:t>
+            </a:r>
+          </a:p>
+        </p:txBody>
+      </p:sp>
+      <p:sp>
+        <p:nvSpPr>
+          <p:cNvPr id="4" name="TextBox 3"/>
+          <p:cNvSpPr txBox="1"/>
+          <p:nvPr/>
+        </p:nvSpPr>
+        <p:spPr>
+          <a:xfrm>
+            <a:off x="8229600" y="6400800"/>
+            <a:ext cx="731520" cy="365760"/>
+          </a:xfrm>
+          <a:prstGeom prst="rect">
+            <a:avLst/>
+          </a:prstGeom>
+          <a:noFill/>
+        </p:spPr>
+        <p:txBody>
+          <a:bodyPr wrap="none">
+            <a:spAutoFit/>
+          </a:bodyPr>
+          <a:lstStyle/>
+          <a:p>
+            <a:pPr algn="r">
+              <a:defRPr sz="1000">
+                <a:solidFill>
+                  <a:srgbClr val="808080"/>
+                </a:solidFill>
+              </a:defRPr>
+            </a:pPr>
+            <a:r>
+              <a:t>31</a:t>
             </a:r>
           </a:p>
         </p:txBody>
@@ -7029,147 +7869,120 @@
               <a:defRPr sz="2000"/>
             </a:pPr>
             <a:r>
-              <a:t>Primary Source:</a:t>
-            </a:r>
-          </a:p>
-          <a:p>
-            <a:pPr>
-              <a:defRPr sz="2000"/>
-            </a:pPr>
-            <a:r>
-              <a:t>  - El Romeh, A., Mirjalili, S., &amp; Šnel, V. (2025)</a:t>
-            </a:r>
-          </a:p>
-          <a:p>
-            <a:pPr>
-              <a:defRPr sz="2000"/>
-            </a:pPr>
-            <a:r>
-              <a:t>    'Dholes-Inspired Optimization'</a:t>
-            </a:r>
-          </a:p>
-          <a:p>
-            <a:pPr>
-              <a:defRPr sz="2000"/>
-            </a:pPr>
-            <a:r>
-              <a:t>    Cluster Computing (Springer)</a:t>
-            </a:r>
-          </a:p>
-          <a:p>
-            <a:pPr>
-              <a:defRPr sz="2000"/>
-            </a:pPr>
-            <a:r>
-              <a:t>    DOI: 10.1007/s10586-025-05543-2</a:t>
-            </a:r>
-          </a:p>
-          <a:p>
-            <a:pPr>
-              <a:defRPr sz="2000"/>
-            </a:pPr>
-          </a:p>
-          <a:p>
-            <a:pPr>
-              <a:defRPr sz="2000"/>
-            </a:pPr>
-            <a:r>
-              <a:t>Datasets:</a:t>
-            </a:r>
-          </a:p>
-          <a:p>
-            <a:pPr>
-              <a:defRPr sz="2000"/>
-            </a:pPr>
-            <a:r>
-              <a:t>  - Breast Cancer Wisconsin: UCI Machine Learning Repository</a:t>
-            </a:r>
-          </a:p>
-          <a:p>
-            <a:pPr>
-              <a:defRPr sz="2000"/>
-            </a:pPr>
-            <a:r>
-              <a:t>  - CIFAR-10: Krizhevsky, A. (2009)</a:t>
-            </a:r>
-          </a:p>
-          <a:p>
-            <a:pPr>
-              <a:defRPr sz="2000"/>
-            </a:pPr>
-          </a:p>
-          <a:p>
-            <a:pPr>
-              <a:defRPr sz="2000"/>
-            </a:pPr>
-            <a:r>
-              <a:t>Code &amp; Implementation:</a:t>
-            </a:r>
-          </a:p>
-          <a:p>
-            <a:pPr>
-              <a:defRPr sz="2000"/>
-            </a:pPr>
-            <a:r>
-              <a:t>  - GitHub: github.com/amine-dubs/dio-optimization</a:t>
-            </a:r>
-          </a:p>
-          <a:p>
-            <a:pPr>
-              <a:defRPr sz="2000"/>
-            </a:pPr>
-            <a:r>
-              <a:t>  - Original MATLAB: github.com/Alyromeh/Dholes-Inspired-Optimization-DIO</a:t>
-            </a:r>
-          </a:p>
-          <a:p>
-            <a:pPr>
-              <a:defRPr sz="2000"/>
-            </a:pPr>
-          </a:p>
-          <a:p>
-            <a:pPr>
-              <a:defRPr sz="2000"/>
-            </a:pPr>
-            <a:r>
-              <a:t>Statistical Methods:</a:t>
-            </a:r>
-          </a:p>
-          <a:p>
-            <a:pPr>
-              <a:defRPr sz="2000"/>
-            </a:pPr>
-            <a:r>
-              <a:t>  - Wilcoxon Signed-Rank Test</a:t>
-            </a:r>
-          </a:p>
-          <a:p>
-            <a:pPr>
-              <a:defRPr sz="2000"/>
-            </a:pPr>
-            <a:r>
-              <a:t>  - 30-Run Validation Protocol</a:t>
-            </a:r>
-          </a:p>
-          <a:p>
-            <a:pPr>
-              <a:defRPr sz="2000"/>
-            </a:pPr>
-          </a:p>
-          <a:p>
-            <a:pPr>
-              <a:defRPr sz="2000"/>
-            </a:pPr>
-            <a:r>
-              <a:t>Deep Learning Features:</a:t>
-            </a:r>
-          </a:p>
-          <a:p>
-            <a:pPr>
-              <a:defRPr sz="2000"/>
-            </a:pPr>
-            <a:r>
-              <a:t>  - ResNet50: He et al. (2016), pretrained on ImageNet</a:t>
+              <a:t>[1] El Romeh, A., Mirjalili, S., &amp; Šnel, V. (2025). Dholes-Inspired Optimization (DIO). Cluster Computing (Springer). DOI: 10.1007/s10586-025-05543-2</a:t>
+            </a:r>
+          </a:p>
+          <a:p>
+            <a:pPr>
+              <a:defRPr sz="2000"/>
+            </a:pPr>
+          </a:p>
+          <a:p>
+            <a:pPr>
+              <a:defRPr sz="2000"/>
+            </a:pPr>
+            <a:r>
+              <a:t>[2] Dua, D. &amp; Graff, C. (2019). UCI Machine Learning Repository: Breast Cancer Wisconsin (Diagnostic) Data Set. University of California, Irvine.</a:t>
+            </a:r>
+          </a:p>
+          <a:p>
+            <a:pPr>
+              <a:defRPr sz="2000"/>
+            </a:pPr>
+          </a:p>
+          <a:p>
+            <a:pPr>
+              <a:defRPr sz="2000"/>
+            </a:pPr>
+            <a:r>
+              <a:t>[3] Krizhevsky, A. (2009). Learning Multiple Layers of Features from Tiny Images. Technical Report, University of Toronto.</a:t>
+            </a:r>
+          </a:p>
+          <a:p>
+            <a:pPr>
+              <a:defRPr sz="2000"/>
+            </a:pPr>
+          </a:p>
+          <a:p>
+            <a:pPr>
+              <a:defRPr sz="2000"/>
+            </a:pPr>
+            <a:r>
+              <a:t>[4] He, K., Zhang, X., Ren, S., &amp; Sun, J. (2016). Deep Residual Learning for Image Recognition. IEEE CVPR.</a:t>
+            </a:r>
+          </a:p>
+          <a:p>
+            <a:pPr>
+              <a:defRPr sz="2000"/>
+            </a:pPr>
+          </a:p>
+          <a:p>
+            <a:pPr>
+              <a:defRPr sz="2000"/>
+            </a:pPr>
+            <a:r>
+              <a:t>[5] Chen, T. &amp; Guestrin, C. (2016). XGBoost: A Scalable Tree Boosting System. KDD '16.</a:t>
+            </a:r>
+          </a:p>
+          <a:p>
+            <a:pPr>
+              <a:defRPr sz="2000"/>
+            </a:pPr>
+          </a:p>
+          <a:p>
+            <a:pPr>
+              <a:defRPr sz="2000"/>
+            </a:pPr>
+            <a:r>
+              <a:t>[6] Breiman, L. (2001). Random Forests. Machine Learning, 45(1), 5-32.</a:t>
+            </a:r>
+          </a:p>
+          <a:p>
+            <a:pPr>
+              <a:defRPr sz="2000"/>
+            </a:pPr>
+          </a:p>
+          <a:p>
+            <a:pPr>
+              <a:defRPr sz="2000"/>
+            </a:pPr>
+            <a:r>
+              <a:t>[7] Wilcoxon, F. (1945). Individual Comparisons by Ranking Methods. Biometrics Bulletin, 1(6), 80-83.</a:t>
+            </a:r>
+          </a:p>
+        </p:txBody>
+      </p:sp>
+      <p:sp>
+        <p:nvSpPr>
+          <p:cNvPr id="4" name="TextBox 3"/>
+          <p:cNvSpPr txBox="1"/>
+          <p:nvPr/>
+        </p:nvSpPr>
+        <p:spPr>
+          <a:xfrm>
+            <a:off x="8229600" y="6400800"/>
+            <a:ext cx="731520" cy="365760"/>
+          </a:xfrm>
+          <a:prstGeom prst="rect">
+            <a:avLst/>
+          </a:prstGeom>
+          <a:noFill/>
+        </p:spPr>
+        <p:txBody>
+          <a:bodyPr wrap="none">
+            <a:spAutoFit/>
+          </a:bodyPr>
+          <a:lstStyle/>
+          <a:p>
+            <a:pPr algn="r">
+              <a:defRPr sz="1000">
+                <a:solidFill>
+                  <a:srgbClr val="808080"/>
+                </a:solidFill>
+              </a:defRPr>
+            </a:pPr>
+            <a:r>
+              <a:t>32</a:t>
             </a:r>
           </a:p>
         </p:txBody>
@@ -7363,6 +8176,41 @@
           </a:p>
         </p:txBody>
       </p:sp>
+      <p:sp>
+        <p:nvSpPr>
+          <p:cNvPr id="4" name="TextBox 3"/>
+          <p:cNvSpPr txBox="1"/>
+          <p:nvPr/>
+        </p:nvSpPr>
+        <p:spPr>
+          <a:xfrm>
+            <a:off x="8229600" y="6400800"/>
+            <a:ext cx="731520" cy="365760"/>
+          </a:xfrm>
+          <a:prstGeom prst="rect">
+            <a:avLst/>
+          </a:prstGeom>
+          <a:noFill/>
+        </p:spPr>
+        <p:txBody>
+          <a:bodyPr wrap="none">
+            <a:spAutoFit/>
+          </a:bodyPr>
+          <a:lstStyle/>
+          <a:p>
+            <a:pPr algn="r">
+              <a:defRPr sz="1000">
+                <a:solidFill>
+                  <a:srgbClr val="808080"/>
+                </a:solidFill>
+              </a:defRPr>
+            </a:pPr>
+            <a:r>
+              <a:t>33</a:t>
+            </a:r>
+          </a:p>
+        </p:txBody>
+      </p:sp>
     </p:spTree>
   </p:cSld>
   <p:clrMapOvr>
@@ -7421,7 +8269,7 @@
               <a:defRPr sz="2000"/>
             </a:pPr>
             <a:r>
-              <a:t>Breast cancer is one of the deadliest diseases affecting women worldwide</a:t>
+              <a:t>Breast cancer is one of the deadliest diseases affecting women worldwide [2]</a:t>
             </a:r>
           </a:p>
           <a:p>
@@ -7492,7 +8340,7 @@
               <a:defRPr sz="2000"/>
             </a:pPr>
             <a:r>
-              <a:t>Our approach: Optimize both together using a nature-inspired algorithm</a:t>
+              <a:t>Our approach: Optimize both together using DIO [1]</a:t>
             </a:r>
           </a:p>
           <a:p>
@@ -7506,6 +8354,41 @@
             </a:pPr>
             <a:r>
               <a:t>This presentation tells the story of what we discovered—successes, failures, and lessons learned</a:t>
+            </a:r>
+          </a:p>
+        </p:txBody>
+      </p:sp>
+      <p:sp>
+        <p:nvSpPr>
+          <p:cNvPr id="4" name="TextBox 3"/>
+          <p:cNvSpPr txBox="1"/>
+          <p:nvPr/>
+        </p:nvSpPr>
+        <p:spPr>
+          <a:xfrm>
+            <a:off x="8229600" y="6400800"/>
+            <a:ext cx="731520" cy="365760"/>
+          </a:xfrm>
+          <a:prstGeom prst="rect">
+            <a:avLst/>
+          </a:prstGeom>
+          <a:noFill/>
+        </p:spPr>
+        <p:txBody>
+          <a:bodyPr wrap="none">
+            <a:spAutoFit/>
+          </a:bodyPr>
+          <a:lstStyle/>
+          <a:p>
+            <a:pPr algn="r">
+              <a:defRPr sz="1000">
+                <a:solidFill>
+                  <a:srgbClr val="808080"/>
+                </a:solidFill>
+              </a:defRPr>
+            </a:pPr>
+            <a:r>
+              <a:t>4</a:t>
             </a:r>
           </a:p>
         </p:txBody>
@@ -7618,6 +8501,41 @@
           </a:p>
         </p:txBody>
       </p:sp>
+      <p:sp>
+        <p:nvSpPr>
+          <p:cNvPr id="4" name="TextBox 3"/>
+          <p:cNvSpPr txBox="1"/>
+          <p:nvPr/>
+        </p:nvSpPr>
+        <p:spPr>
+          <a:xfrm>
+            <a:off x="8229600" y="6400800"/>
+            <a:ext cx="731520" cy="365760"/>
+          </a:xfrm>
+          <a:prstGeom prst="rect">
+            <a:avLst/>
+          </a:prstGeom>
+          <a:noFill/>
+        </p:spPr>
+        <p:txBody>
+          <a:bodyPr wrap="none">
+            <a:spAutoFit/>
+          </a:bodyPr>
+          <a:lstStyle/>
+          <a:p>
+            <a:pPr algn="r">
+              <a:defRPr sz="1000">
+                <a:solidFill>
+                  <a:srgbClr val="808080"/>
+                </a:solidFill>
+              </a:defRPr>
+            </a:pPr>
+            <a:r>
+              <a:t>5</a:t>
+            </a:r>
+          </a:p>
+        </p:txBody>
+      </p:sp>
     </p:spTree>
   </p:cSld>
   <p:clrMapOvr>
@@ -7676,7 +8594,7 @@
               <a:defRPr sz="2000"/>
             </a:pPr>
             <a:r>
-              <a:t>Created in 2025 by international researchers:</a:t>
+              <a:t>Created in 2025 by international researchers [1]:</a:t>
             </a:r>
           </a:p>
           <a:p>
@@ -7780,6 +8698,41 @@
             </a:pPr>
             <a:r>
               <a:t>Code is open-source: Available on GitHub and MATLAB File Exchange</a:t>
+            </a:r>
+          </a:p>
+        </p:txBody>
+      </p:sp>
+      <p:sp>
+        <p:nvSpPr>
+          <p:cNvPr id="4" name="TextBox 3"/>
+          <p:cNvSpPr txBox="1"/>
+          <p:nvPr/>
+        </p:nvSpPr>
+        <p:spPr>
+          <a:xfrm>
+            <a:off x="8229600" y="6400800"/>
+            <a:ext cx="731520" cy="365760"/>
+          </a:xfrm>
+          <a:prstGeom prst="rect">
+            <a:avLst/>
+          </a:prstGeom>
+          <a:noFill/>
+        </p:spPr>
+        <p:txBody>
+          <a:bodyPr wrap="none">
+            <a:spAutoFit/>
+          </a:bodyPr>
+          <a:lstStyle/>
+          <a:p>
+            <a:pPr algn="r">
+              <a:defRPr sz="1000">
+                <a:solidFill>
+                  <a:srgbClr val="808080"/>
+                </a:solidFill>
+              </a:defRPr>
+            </a:pPr>
+            <a:r>
+              <a:t>6</a:t>
             </a:r>
           </a:p>
         </p:txBody>
@@ -7960,6 +8913,41 @@
           </a:p>
         </p:txBody>
       </p:sp>
+      <p:sp>
+        <p:nvSpPr>
+          <p:cNvPr id="4" name="TextBox 3"/>
+          <p:cNvSpPr txBox="1"/>
+          <p:nvPr/>
+        </p:nvSpPr>
+        <p:spPr>
+          <a:xfrm>
+            <a:off x="8229600" y="6400800"/>
+            <a:ext cx="731520" cy="365760"/>
+          </a:xfrm>
+          <a:prstGeom prst="rect">
+            <a:avLst/>
+          </a:prstGeom>
+          <a:noFill/>
+        </p:spPr>
+        <p:txBody>
+          <a:bodyPr wrap="none">
+            <a:spAutoFit/>
+          </a:bodyPr>
+          <a:lstStyle/>
+          <a:p>
+            <a:pPr algn="r">
+              <a:defRPr sz="1000">
+                <a:solidFill>
+                  <a:srgbClr val="808080"/>
+                </a:solidFill>
+              </a:defRPr>
+            </a:pPr>
+            <a:r>
+              <a:t>7</a:t>
+            </a:r>
+          </a:p>
+        </p:txBody>
+      </p:sp>
     </p:spTree>
   </p:cSld>
   <p:clrMapOvr>
@@ -8113,6 +9101,41 @@
           </a:p>
         </p:txBody>
       </p:sp>
+      <p:sp>
+        <p:nvSpPr>
+          <p:cNvPr id="4" name="TextBox 3"/>
+          <p:cNvSpPr txBox="1"/>
+          <p:nvPr/>
+        </p:nvSpPr>
+        <p:spPr>
+          <a:xfrm>
+            <a:off x="8229600" y="6400800"/>
+            <a:ext cx="731520" cy="365760"/>
+          </a:xfrm>
+          <a:prstGeom prst="rect">
+            <a:avLst/>
+          </a:prstGeom>
+          <a:noFill/>
+        </p:spPr>
+        <p:txBody>
+          <a:bodyPr wrap="none">
+            <a:spAutoFit/>
+          </a:bodyPr>
+          <a:lstStyle/>
+          <a:p>
+            <a:pPr algn="r">
+              <a:defRPr sz="1000">
+                <a:solidFill>
+                  <a:srgbClr val="808080"/>
+                </a:solidFill>
+              </a:defRPr>
+            </a:pPr>
+            <a:r>
+              <a:t>8</a:t>
+            </a:r>
+          </a:p>
+        </p:txBody>
+      </p:sp>
     </p:spTree>
   </p:cSld>
   <p:clrMapOvr>
@@ -8272,6 +9295,41 @@
             </a:pPr>
             <a:r>
               <a:t>The beauty: Simple math, powerful results</a:t>
+            </a:r>
+          </a:p>
+        </p:txBody>
+      </p:sp>
+      <p:sp>
+        <p:nvSpPr>
+          <p:cNvPr id="4" name="TextBox 3"/>
+          <p:cNvSpPr txBox="1"/>
+          <p:nvPr/>
+        </p:nvSpPr>
+        <p:spPr>
+          <a:xfrm>
+            <a:off x="8229600" y="6400800"/>
+            <a:ext cx="731520" cy="365760"/>
+          </a:xfrm>
+          <a:prstGeom prst="rect">
+            <a:avLst/>
+          </a:prstGeom>
+          <a:noFill/>
+        </p:spPr>
+        <p:txBody>
+          <a:bodyPr wrap="none">
+            <a:spAutoFit/>
+          </a:bodyPr>
+          <a:lstStyle/>
+          <a:p>
+            <a:pPr algn="r">
+              <a:defRPr sz="1000">
+                <a:solidFill>
+                  <a:srgbClr val="808080"/>
+                </a:solidFill>
+              </a:defRPr>
+            </a:pPr>
+            <a:r>
+              <a:t>9</a:t>
             </a:r>
           </a:p>
         </p:txBody>

</xml_diff>